<commit_message>
rework figures and some minor corrections
</commit_message>
<xml_diff>
--- a/paper/figures.pptx
+++ b/paper/figures.pptx
@@ -252,7 +252,7 @@
           <a:p>
             <a:fld id="{FB67499A-1896-4127-9D1E-F3D8B8129D21}" type="datetimeFigureOut">
               <a:rPr lang="de-DE" smtClean="0"/>
-              <a:t>05.02.2025</a:t>
+              <a:t>13.07.2025</a:t>
             </a:fld>
             <a:endParaRPr lang="de-DE"/>
           </a:p>
@@ -422,7 +422,7 @@
           <a:p>
             <a:fld id="{FB67499A-1896-4127-9D1E-F3D8B8129D21}" type="datetimeFigureOut">
               <a:rPr lang="de-DE" smtClean="0"/>
-              <a:t>05.02.2025</a:t>
+              <a:t>13.07.2025</a:t>
             </a:fld>
             <a:endParaRPr lang="de-DE"/>
           </a:p>
@@ -602,7 +602,7 @@
           <a:p>
             <a:fld id="{FB67499A-1896-4127-9D1E-F3D8B8129D21}" type="datetimeFigureOut">
               <a:rPr lang="de-DE" smtClean="0"/>
-              <a:t>05.02.2025</a:t>
+              <a:t>13.07.2025</a:t>
             </a:fld>
             <a:endParaRPr lang="de-DE"/>
           </a:p>
@@ -772,7 +772,7 @@
           <a:p>
             <a:fld id="{FB67499A-1896-4127-9D1E-F3D8B8129D21}" type="datetimeFigureOut">
               <a:rPr lang="de-DE" smtClean="0"/>
-              <a:t>05.02.2025</a:t>
+              <a:t>13.07.2025</a:t>
             </a:fld>
             <a:endParaRPr lang="de-DE"/>
           </a:p>
@@ -1018,7 +1018,7 @@
           <a:p>
             <a:fld id="{FB67499A-1896-4127-9D1E-F3D8B8129D21}" type="datetimeFigureOut">
               <a:rPr lang="de-DE" smtClean="0"/>
-              <a:t>05.02.2025</a:t>
+              <a:t>13.07.2025</a:t>
             </a:fld>
             <a:endParaRPr lang="de-DE"/>
           </a:p>
@@ -1250,7 +1250,7 @@
           <a:p>
             <a:fld id="{FB67499A-1896-4127-9D1E-F3D8B8129D21}" type="datetimeFigureOut">
               <a:rPr lang="de-DE" smtClean="0"/>
-              <a:t>05.02.2025</a:t>
+              <a:t>13.07.2025</a:t>
             </a:fld>
             <a:endParaRPr lang="de-DE"/>
           </a:p>
@@ -1617,7 +1617,7 @@
           <a:p>
             <a:fld id="{FB67499A-1896-4127-9D1E-F3D8B8129D21}" type="datetimeFigureOut">
               <a:rPr lang="de-DE" smtClean="0"/>
-              <a:t>05.02.2025</a:t>
+              <a:t>13.07.2025</a:t>
             </a:fld>
             <a:endParaRPr lang="de-DE"/>
           </a:p>
@@ -1735,7 +1735,7 @@
           <a:p>
             <a:fld id="{FB67499A-1896-4127-9D1E-F3D8B8129D21}" type="datetimeFigureOut">
               <a:rPr lang="de-DE" smtClean="0"/>
-              <a:t>05.02.2025</a:t>
+              <a:t>13.07.2025</a:t>
             </a:fld>
             <a:endParaRPr lang="de-DE"/>
           </a:p>
@@ -1830,7 +1830,7 @@
           <a:p>
             <a:fld id="{FB67499A-1896-4127-9D1E-F3D8B8129D21}" type="datetimeFigureOut">
               <a:rPr lang="de-DE" smtClean="0"/>
-              <a:t>05.02.2025</a:t>
+              <a:t>13.07.2025</a:t>
             </a:fld>
             <a:endParaRPr lang="de-DE"/>
           </a:p>
@@ -2107,7 +2107,7 @@
           <a:p>
             <a:fld id="{FB67499A-1896-4127-9D1E-F3D8B8129D21}" type="datetimeFigureOut">
               <a:rPr lang="de-DE" smtClean="0"/>
-              <a:t>05.02.2025</a:t>
+              <a:t>13.07.2025</a:t>
             </a:fld>
             <a:endParaRPr lang="de-DE"/>
           </a:p>
@@ -2364,7 +2364,7 @@
           <a:p>
             <a:fld id="{FB67499A-1896-4127-9D1E-F3D8B8129D21}" type="datetimeFigureOut">
               <a:rPr lang="de-DE" smtClean="0"/>
-              <a:t>05.02.2025</a:t>
+              <a:t>13.07.2025</a:t>
             </a:fld>
             <a:endParaRPr lang="de-DE"/>
           </a:p>
@@ -2577,7 +2577,7 @@
           <a:p>
             <a:fld id="{FB67499A-1896-4127-9D1E-F3D8B8129D21}" type="datetimeFigureOut">
               <a:rPr lang="de-DE" smtClean="0"/>
-              <a:t>05.02.2025</a:t>
+              <a:t>13.07.2025</a:t>
             </a:fld>
             <a:endParaRPr lang="de-DE"/>
           </a:p>
@@ -3004,9 +3004,7 @@
               <a:gd name="adj" fmla="val 782"/>
             </a:avLst>
           </a:prstGeom>
-          <a:solidFill>
-            <a:schemeClr val="bg1"/>
-          </a:solidFill>
+          <a:noFill/>
           <a:ln w="22225">
             <a:solidFill>
               <a:schemeClr val="bg2">
@@ -4055,78 +4053,6 @@
             </a:p>
           </p:txBody>
         </p:sp>
-        <p:pic>
-          <p:nvPicPr>
-            <p:cNvPr id="56" name="Grafik 55">
-              <a:extLst>
-                <a:ext uri="{FF2B5EF4-FFF2-40B4-BE49-F238E27FC236}">
-                  <a16:creationId xmlns:a16="http://schemas.microsoft.com/office/drawing/2014/main" id="{8854777D-A9B9-5B0E-B754-B924A9B20433}"/>
-                </a:ext>
-              </a:extLst>
-            </p:cNvPr>
-            <p:cNvPicPr>
-              <a:picLocks noChangeAspect="1"/>
-            </p:cNvPicPr>
-            <p:nvPr/>
-          </p:nvPicPr>
-          <p:blipFill>
-            <a:blip r:embed="rId6">
-              <a:extLst>
-                <a:ext uri="{96DAC541-7B7A-43D3-8B79-37D633B846F1}">
-                  <asvg:svgBlip xmlns:asvg="http://schemas.microsoft.com/office/drawing/2016/SVG/main" r:embed="rId7"/>
-                </a:ext>
-              </a:extLst>
-            </a:blip>
-            <a:stretch>
-              <a:fillRect/>
-            </a:stretch>
-          </p:blipFill>
-          <p:spPr>
-            <a:xfrm>
-              <a:off x="8127350" y="8911221"/>
-              <a:ext cx="2084712" cy="1389808"/>
-            </a:xfrm>
-            <a:prstGeom prst="rect">
-              <a:avLst/>
-            </a:prstGeom>
-          </p:spPr>
-        </p:pic>
-        <p:pic>
-          <p:nvPicPr>
-            <p:cNvPr id="58" name="Grafik 57">
-              <a:extLst>
-                <a:ext uri="{FF2B5EF4-FFF2-40B4-BE49-F238E27FC236}">
-                  <a16:creationId xmlns:a16="http://schemas.microsoft.com/office/drawing/2014/main" id="{316E5778-A419-B62E-6BAF-5EC7DE27E7E7}"/>
-                </a:ext>
-              </a:extLst>
-            </p:cNvPr>
-            <p:cNvPicPr>
-              <a:picLocks noChangeAspect="1"/>
-            </p:cNvPicPr>
-            <p:nvPr/>
-          </p:nvPicPr>
-          <p:blipFill>
-            <a:blip r:embed="rId8">
-              <a:extLst>
-                <a:ext uri="{96DAC541-7B7A-43D3-8B79-37D633B846F1}">
-                  <asvg:svgBlip xmlns:asvg="http://schemas.microsoft.com/office/drawing/2016/SVG/main" r:embed="rId9"/>
-                </a:ext>
-              </a:extLst>
-            </a:blip>
-            <a:stretch>
-              <a:fillRect/>
-            </a:stretch>
-          </p:blipFill>
-          <p:spPr>
-            <a:xfrm>
-              <a:off x="8644887" y="10554444"/>
-              <a:ext cx="1250787" cy="1321693"/>
-            </a:xfrm>
-            <a:prstGeom prst="rect">
-              <a:avLst/>
-            </a:prstGeom>
-          </p:spPr>
-        </p:pic>
         <p:sp>
           <p:nvSpPr>
             <p:cNvPr id="59" name="Pfeil: nach unten 58">
@@ -4384,10 +4310,10 @@
         </p:nvGrpSpPr>
         <p:grpSpPr>
           <a:xfrm>
-            <a:off x="755649" y="288831"/>
-            <a:ext cx="10204451" cy="3492593"/>
-            <a:chOff x="755649" y="288831"/>
-            <a:chExt cx="10204451" cy="3492593"/>
+            <a:off x="750871" y="288831"/>
+            <a:ext cx="10209229" cy="3492593"/>
+            <a:chOff x="750871" y="288831"/>
+            <a:chExt cx="10209229" cy="3492593"/>
           </a:xfrm>
         </p:grpSpPr>
         <p:sp>
@@ -4412,9 +4338,7 @@
                 <a:gd name="adj" fmla="val 1647"/>
               </a:avLst>
             </a:prstGeom>
-            <a:solidFill>
-              <a:schemeClr val="bg1"/>
-            </a:solidFill>
+            <a:noFill/>
             <a:ln w="31750">
               <a:solidFill>
                 <a:srgbClr val="002060"/>
@@ -4500,7 +4424,7 @@
           </p:nvSpPr>
           <p:spPr>
             <a:xfrm>
-              <a:off x="1687551" y="3384551"/>
+              <a:off x="750871" y="3409206"/>
               <a:ext cx="2593751" cy="369332"/>
             </a:xfrm>
             <a:prstGeom prst="rect">
@@ -5401,10 +5325,10 @@
               <p:nvPr/>
             </p:nvPicPr>
             <p:blipFill>
-              <a:blip r:embed="rId10">
+              <a:blip r:embed="rId6">
                 <a:extLst>
                   <a:ext uri="{96DAC541-7B7A-43D3-8B79-37D633B846F1}">
-                    <asvg:svgBlip xmlns:asvg="http://schemas.microsoft.com/office/drawing/2016/SVG/main" r:embed="rId11"/>
+                    <asvg:svgBlip xmlns:asvg="http://schemas.microsoft.com/office/drawing/2016/SVG/main" r:embed="rId7"/>
                   </a:ext>
                 </a:extLst>
               </a:blip>
@@ -5548,10 +5472,10 @@
               <p:nvPr/>
             </p:nvPicPr>
             <p:blipFill>
-              <a:blip r:embed="rId12">
+              <a:blip r:embed="rId8">
                 <a:extLst>
                   <a:ext uri="{96DAC541-7B7A-43D3-8B79-37D633B846F1}">
-                    <asvg:svgBlip xmlns:asvg="http://schemas.microsoft.com/office/drawing/2016/SVG/main" r:embed="rId13"/>
+                    <asvg:svgBlip xmlns:asvg="http://schemas.microsoft.com/office/drawing/2016/SVG/main" r:embed="rId9"/>
                   </a:ext>
                 </a:extLst>
               </a:blip>
@@ -5584,10 +5508,10 @@
             <p:nvPr/>
           </p:nvPicPr>
           <p:blipFill>
-            <a:blip r:embed="rId14">
+            <a:blip r:embed="rId10">
               <a:extLst>
                 <a:ext uri="{96DAC541-7B7A-43D3-8B79-37D633B846F1}">
-                  <asvg:svgBlip xmlns:asvg="http://schemas.microsoft.com/office/drawing/2016/SVG/main" r:embed="rId15"/>
+                  <asvg:svgBlip xmlns:asvg="http://schemas.microsoft.com/office/drawing/2016/SVG/main" r:embed="rId11"/>
                 </a:ext>
               </a:extLst>
             </a:blip>
@@ -5930,12 +5854,201 @@
           </a:fontRef>
         </p:style>
       </p:cxnSp>
+      <p:grpSp>
+        <p:nvGrpSpPr>
+          <p:cNvPr id="6" name="Gruppieren 5">
+            <a:extLst>
+              <a:ext uri="{FF2B5EF4-FFF2-40B4-BE49-F238E27FC236}">
+                <a16:creationId xmlns:a16="http://schemas.microsoft.com/office/drawing/2014/main" id="{250B05CB-0DC1-4143-4B64-53744F219182}"/>
+              </a:ext>
+            </a:extLst>
+          </p:cNvPr>
+          <p:cNvGrpSpPr/>
+          <p:nvPr/>
+        </p:nvGrpSpPr>
+        <p:grpSpPr>
+          <a:xfrm>
+            <a:off x="819671" y="2021010"/>
+            <a:ext cx="4503889" cy="1711035"/>
+            <a:chOff x="819671" y="2021010"/>
+            <a:chExt cx="4503889" cy="1711035"/>
+          </a:xfrm>
+        </p:grpSpPr>
+        <p:pic>
+          <p:nvPicPr>
+            <p:cNvPr id="4" name="Grafik 3">
+              <a:extLst>
+                <a:ext uri="{FF2B5EF4-FFF2-40B4-BE49-F238E27FC236}">
+                  <a16:creationId xmlns:a16="http://schemas.microsoft.com/office/drawing/2014/main" id="{EDBAFB5E-1C0B-AD8F-3A9B-937736E3327E}"/>
+                </a:ext>
+              </a:extLst>
+            </p:cNvPr>
+            <p:cNvPicPr>
+              <a:picLocks noChangeAspect="1"/>
+            </p:cNvPicPr>
+            <p:nvPr/>
+          </p:nvPicPr>
+          <p:blipFill>
+            <a:blip r:embed="rId12">
+              <a:extLst>
+                <a:ext uri="{96DAC541-7B7A-43D3-8B79-37D633B846F1}">
+                  <asvg:svgBlip xmlns:asvg="http://schemas.microsoft.com/office/drawing/2016/SVG/main" r:embed="rId13"/>
+                </a:ext>
+              </a:extLst>
+            </a:blip>
+            <a:stretch>
+              <a:fillRect/>
+            </a:stretch>
+          </p:blipFill>
+          <p:spPr>
+            <a:xfrm>
+              <a:off x="3289663" y="2021010"/>
+              <a:ext cx="2033897" cy="1711035"/>
+            </a:xfrm>
+            <a:prstGeom prst="rect">
+              <a:avLst/>
+            </a:prstGeom>
+          </p:spPr>
+        </p:pic>
+        <p:sp>
+          <p:nvSpPr>
+            <p:cNvPr id="27" name="Textfeld 26">
+              <a:extLst>
+                <a:ext uri="{FF2B5EF4-FFF2-40B4-BE49-F238E27FC236}">
+                  <a16:creationId xmlns:a16="http://schemas.microsoft.com/office/drawing/2014/main" id="{B9776A02-8B0E-E6DA-0B23-D4A28E391C81}"/>
+                </a:ext>
+              </a:extLst>
+            </p:cNvPr>
+            <p:cNvSpPr txBox="1"/>
+            <p:nvPr/>
+          </p:nvSpPr>
+          <p:spPr>
+            <a:xfrm>
+              <a:off x="819671" y="3000220"/>
+              <a:ext cx="3063875" cy="307777"/>
+            </a:xfrm>
+            <a:prstGeom prst="rect">
+              <a:avLst/>
+            </a:prstGeom>
+            <a:noFill/>
+          </p:spPr>
+          <p:txBody>
+            <a:bodyPr wrap="square">
+              <a:spAutoFit/>
+            </a:bodyPr>
+            <a:lstStyle/>
+            <a:p>
+              <a:r>
+                <a:rPr lang="de-DE" sz="1400" b="0" i="0" dirty="0">
+                  <a:solidFill>
+                    <a:schemeClr val="tx1"/>
+                  </a:solidFill>
+                  <a:effectLst/>
+                  <a:latin typeface="Courier New" panose="02070309020205020404" pitchFamily="49" charset="0"/>
+                </a:rPr>
+                <a:t>&gt; </a:t>
+              </a:r>
+              <a:r>
+                <a:rPr lang="de-DE" sz="1400" b="0" i="0" dirty="0" err="1">
+                  <a:solidFill>
+                    <a:schemeClr val="tx1"/>
+                  </a:solidFill>
+                  <a:effectLst/>
+                  <a:latin typeface="Courier New" panose="02070309020205020404" pitchFamily="49" charset="0"/>
+                </a:rPr>
+                <a:t>FmuModel</a:t>
+              </a:r>
+              <a:r>
+                <a:rPr lang="de-DE" sz="1400" b="0" i="0" dirty="0" err="1">
+                  <a:solidFill>
+                    <a:srgbClr val="000000"/>
+                  </a:solidFill>
+                  <a:effectLst/>
+                  <a:latin typeface="Courier New" panose="02070309020205020404" pitchFamily="49" charset="0"/>
+                </a:rPr>
+                <a:t>.</a:t>
+              </a:r>
+              <a:r>
+                <a:rPr lang="de-DE" sz="1400" b="0" i="0" dirty="0" err="1">
+                  <a:solidFill>
+                    <a:schemeClr val="tx2">
+                      <a:lumMod val="90000"/>
+                      <a:lumOff val="10000"/>
+                    </a:schemeClr>
+                  </a:solidFill>
+                  <a:effectLst/>
+                  <a:latin typeface="Courier New" panose="02070309020205020404" pitchFamily="49" charset="0"/>
+                </a:rPr>
+                <a:t>simulate</a:t>
+              </a:r>
+              <a:r>
+                <a:rPr lang="de-DE" sz="1400" b="0" i="0" dirty="0">
+                  <a:solidFill>
+                    <a:srgbClr val="000000"/>
+                  </a:solidFill>
+                  <a:effectLst/>
+                  <a:latin typeface="Courier New" panose="02070309020205020404" pitchFamily="49" charset="0"/>
+                </a:rPr>
+                <a:t>(..)</a:t>
+              </a:r>
+              <a:r>
+                <a:rPr lang="de-DE" sz="1400" b="0" i="0" dirty="0">
+                  <a:solidFill>
+                    <a:srgbClr val="000000"/>
+                  </a:solidFill>
+                  <a:effectLst/>
+                  <a:latin typeface="Courier New" panose="02070309020205020404" pitchFamily="49" charset="0"/>
+                  <a:sym typeface="Wingdings" panose="05000000000000000000" pitchFamily="2" charset="2"/>
+                </a:rPr>
+                <a:t> </a:t>
+              </a:r>
+              <a:endParaRPr lang="de-DE" sz="1400" dirty="0"/>
+            </a:p>
+          </p:txBody>
+        </p:sp>
+      </p:grpSp>
       <p:pic>
         <p:nvPicPr>
-          <p:cNvPr id="23" name="Grafik 22">
+          <p:cNvPr id="10" name="Grafik 9">
             <a:extLst>
               <a:ext uri="{FF2B5EF4-FFF2-40B4-BE49-F238E27FC236}">
-                <a16:creationId xmlns:a16="http://schemas.microsoft.com/office/drawing/2014/main" id="{8F577F4B-983C-63FE-C4F9-A92354777969}"/>
+                <a16:creationId xmlns:a16="http://schemas.microsoft.com/office/drawing/2014/main" id="{8C78806E-22F3-5D96-FA05-98425EAFDA4F}"/>
+              </a:ext>
+            </a:extLst>
+          </p:cNvPr>
+          <p:cNvPicPr>
+            <a:picLocks noChangeAspect="1"/>
+          </p:cNvPicPr>
+          <p:nvPr/>
+        </p:nvPicPr>
+        <p:blipFill>
+          <a:blip r:embed="rId14">
+            <a:extLst>
+              <a:ext uri="{96DAC541-7B7A-43D3-8B79-37D633B846F1}">
+                <asvg:svgBlip xmlns:asvg="http://schemas.microsoft.com/office/drawing/2016/SVG/main" r:embed="rId15"/>
+              </a:ext>
+            </a:extLst>
+          </a:blip>
+          <a:stretch>
+            <a:fillRect/>
+          </a:stretch>
+        </p:blipFill>
+        <p:spPr>
+          <a:xfrm>
+            <a:off x="8359752" y="9551652"/>
+            <a:ext cx="1842827" cy="1383622"/>
+          </a:xfrm>
+          <a:prstGeom prst="rect">
+            <a:avLst/>
+          </a:prstGeom>
+        </p:spPr>
+      </p:pic>
+      <p:pic>
+        <p:nvPicPr>
+          <p:cNvPr id="26" name="Grafik 25">
+            <a:extLst>
+              <a:ext uri="{FF2B5EF4-FFF2-40B4-BE49-F238E27FC236}">
+                <a16:creationId xmlns:a16="http://schemas.microsoft.com/office/drawing/2014/main" id="{42F1E283-6E3E-CAEE-32C8-CA6EC3DE4DEE}"/>
               </a:ext>
             </a:extLst>
           </p:cNvPr>
@@ -5958,116 +6071,20 @@
         </p:blipFill>
         <p:spPr>
           <a:xfrm>
-            <a:off x="3312363" y="1968372"/>
-            <a:ext cx="1981437" cy="1487691"/>
+            <a:off x="8560388" y="11157416"/>
+            <a:ext cx="1460746" cy="1460746"/>
           </a:xfrm>
           <a:prstGeom prst="rect">
             <a:avLst/>
           </a:prstGeom>
         </p:spPr>
       </p:pic>
-      <p:sp>
-        <p:nvSpPr>
-          <p:cNvPr id="27" name="Textfeld 26">
+      <p:pic>
+        <p:nvPicPr>
+          <p:cNvPr id="47" name="Grafik 46">
             <a:extLst>
               <a:ext uri="{FF2B5EF4-FFF2-40B4-BE49-F238E27FC236}">
-                <a16:creationId xmlns:a16="http://schemas.microsoft.com/office/drawing/2014/main" id="{B9776A02-8B0E-E6DA-0B23-D4A28E391C81}"/>
-              </a:ext>
-            </a:extLst>
-          </p:cNvPr>
-          <p:cNvSpPr txBox="1"/>
-          <p:nvPr/>
-        </p:nvSpPr>
-        <p:spPr>
-          <a:xfrm>
-            <a:off x="819671" y="3000220"/>
-            <a:ext cx="3063875" cy="307777"/>
-          </a:xfrm>
-          <a:prstGeom prst="rect">
-            <a:avLst/>
-          </a:prstGeom>
-          <a:noFill/>
-        </p:spPr>
-        <p:txBody>
-          <a:bodyPr wrap="square">
-            <a:spAutoFit/>
-          </a:bodyPr>
-          <a:lstStyle/>
-          <a:p>
-            <a:r>
-              <a:rPr lang="de-DE" sz="1400" b="0" i="0" dirty="0">
-                <a:solidFill>
-                  <a:schemeClr val="tx1"/>
-                </a:solidFill>
-                <a:effectLst/>
-                <a:latin typeface="Courier New" panose="02070309020205020404" pitchFamily="49" charset="0"/>
-              </a:rPr>
-              <a:t>&gt; </a:t>
-            </a:r>
-            <a:r>
-              <a:rPr lang="de-DE" sz="1400" b="0" i="0" dirty="0" err="1">
-                <a:solidFill>
-                  <a:schemeClr val="tx1"/>
-                </a:solidFill>
-                <a:effectLst/>
-                <a:latin typeface="Courier New" panose="02070309020205020404" pitchFamily="49" charset="0"/>
-              </a:rPr>
-              <a:t>FmuModel</a:t>
-            </a:r>
-            <a:r>
-              <a:rPr lang="de-DE" sz="1400" b="0" i="0" dirty="0" err="1">
-                <a:solidFill>
-                  <a:srgbClr val="000000"/>
-                </a:solidFill>
-                <a:effectLst/>
-                <a:latin typeface="Courier New" panose="02070309020205020404" pitchFamily="49" charset="0"/>
-              </a:rPr>
-              <a:t>.</a:t>
-            </a:r>
-            <a:r>
-              <a:rPr lang="de-DE" sz="1400" b="0" i="0" dirty="0" err="1">
-                <a:solidFill>
-                  <a:schemeClr val="tx2">
-                    <a:lumMod val="90000"/>
-                    <a:lumOff val="10000"/>
-                  </a:schemeClr>
-                </a:solidFill>
-                <a:effectLst/>
-                <a:latin typeface="Courier New" panose="02070309020205020404" pitchFamily="49" charset="0"/>
-              </a:rPr>
-              <a:t>simulate</a:t>
-            </a:r>
-            <a:r>
-              <a:rPr lang="de-DE" sz="1400" b="0" i="0" dirty="0">
-                <a:solidFill>
-                  <a:srgbClr val="000000"/>
-                </a:solidFill>
-                <a:effectLst/>
-                <a:latin typeface="Courier New" panose="02070309020205020404" pitchFamily="49" charset="0"/>
-              </a:rPr>
-              <a:t>(..) </a:t>
-            </a:r>
-            <a:r>
-              <a:rPr lang="de-DE" sz="1400" b="0" i="0" dirty="0">
-                <a:solidFill>
-                  <a:srgbClr val="000000"/>
-                </a:solidFill>
-                <a:effectLst/>
-                <a:latin typeface="Courier New" panose="02070309020205020404" pitchFamily="49" charset="0"/>
-                <a:sym typeface="Wingdings" panose="05000000000000000000" pitchFamily="2" charset="2"/>
-              </a:rPr>
-              <a:t> </a:t>
-            </a:r>
-            <a:endParaRPr lang="de-DE" sz="1400" dirty="0"/>
-          </a:p>
-        </p:txBody>
-      </p:sp>
-      <p:pic>
-        <p:nvPicPr>
-          <p:cNvPr id="49" name="Grafik 48">
-            <a:extLst>
-              <a:ext uri="{FF2B5EF4-FFF2-40B4-BE49-F238E27FC236}">
-                <a16:creationId xmlns:a16="http://schemas.microsoft.com/office/drawing/2014/main" id="{C2B84666-45D3-A888-88B9-B7DED8D11E26}"/>
+                <a16:creationId xmlns:a16="http://schemas.microsoft.com/office/drawing/2014/main" id="{C2B75594-11A0-B730-49B2-A05DF4C87C14}"/>
               </a:ext>
             </a:extLst>
           </p:cNvPr>
@@ -6090,8 +6107,8 @@
         </p:blipFill>
         <p:spPr>
           <a:xfrm>
-            <a:off x="8327535" y="7820154"/>
-            <a:ext cx="1884527" cy="1414930"/>
+            <a:off x="8304934" y="7787447"/>
+            <a:ext cx="1971651" cy="1480344"/>
           </a:xfrm>
           <a:prstGeom prst="rect">
             <a:avLst/>
@@ -7208,42 +7225,6 @@
           </a:prstGeom>
         </p:spPr>
       </p:pic>
-      <p:pic>
-        <p:nvPicPr>
-          <p:cNvPr id="8" name="Grafik 7">
-            <a:extLst>
-              <a:ext uri="{FF2B5EF4-FFF2-40B4-BE49-F238E27FC236}">
-                <a16:creationId xmlns:a16="http://schemas.microsoft.com/office/drawing/2014/main" id="{CA2EA476-EA99-DF06-55A1-AEE097F42455}"/>
-              </a:ext>
-            </a:extLst>
-          </p:cNvPr>
-          <p:cNvPicPr>
-            <a:picLocks noChangeAspect="1"/>
-          </p:cNvPicPr>
-          <p:nvPr/>
-        </p:nvPicPr>
-        <p:blipFill>
-          <a:blip r:embed="rId4">
-            <a:extLst>
-              <a:ext uri="{96DAC541-7B7A-43D3-8B79-37D633B846F1}">
-                <asvg:svgBlip xmlns:asvg="http://schemas.microsoft.com/office/drawing/2016/SVG/main" r:embed="rId5"/>
-              </a:ext>
-            </a:extLst>
-          </a:blip>
-          <a:stretch>
-            <a:fillRect/>
-          </a:stretch>
-        </p:blipFill>
-        <p:spPr>
-          <a:xfrm>
-            <a:off x="2229030" y="11958076"/>
-            <a:ext cx="1339671" cy="1005844"/>
-          </a:xfrm>
-          <a:prstGeom prst="rect">
-            <a:avLst/>
-          </a:prstGeom>
-        </p:spPr>
-      </p:pic>
       <p:sp>
         <p:nvSpPr>
           <p:cNvPr id="20" name="Rechteck: abgerundete Ecken 19">
@@ -7645,10 +7626,10 @@
             <p:nvPr/>
           </p:nvPicPr>
           <p:blipFill>
-            <a:blip r:embed="rId6">
+            <a:blip r:embed="rId4">
               <a:extLst>
                 <a:ext uri="{96DAC541-7B7A-43D3-8B79-37D633B846F1}">
-                  <asvg:svgBlip xmlns:asvg="http://schemas.microsoft.com/office/drawing/2016/SVG/main" r:embed="rId7"/>
+                  <asvg:svgBlip xmlns:asvg="http://schemas.microsoft.com/office/drawing/2016/SVG/main" r:embed="rId5"/>
                 </a:ext>
               </a:extLst>
             </a:blip>
@@ -7755,10 +7736,10 @@
             <p:nvPr/>
           </p:nvPicPr>
           <p:blipFill>
-            <a:blip r:embed="rId8">
+            <a:blip r:embed="rId6">
               <a:extLst>
                 <a:ext uri="{96DAC541-7B7A-43D3-8B79-37D633B846F1}">
-                  <asvg:svgBlip xmlns:asvg="http://schemas.microsoft.com/office/drawing/2016/SVG/main" r:embed="rId9"/>
+                  <asvg:svgBlip xmlns:asvg="http://schemas.microsoft.com/office/drawing/2016/SVG/main" r:embed="rId7"/>
                 </a:ext>
               </a:extLst>
             </a:blip>
@@ -8484,7 +8465,7 @@
           <p:nvPr/>
         </p:nvPicPr>
         <p:blipFill>
-          <a:blip r:embed="rId10"/>
+          <a:blip r:embed="rId8"/>
           <a:stretch>
             <a:fillRect/>
           </a:stretch>
@@ -8517,7 +8498,7 @@
           <p:nvPr/>
         </p:nvPicPr>
         <p:blipFill>
-          <a:blip r:embed="rId11"/>
+          <a:blip r:embed="rId9"/>
           <a:stretch>
             <a:fillRect/>
           </a:stretch>
@@ -8547,7 +8528,7 @@
           <p:nvPr/>
         </p:nvPicPr>
         <p:blipFill>
-          <a:blip r:embed="rId12"/>
+          <a:blip r:embed="rId10"/>
           <a:stretch>
             <a:fillRect/>
           </a:stretch>
@@ -8577,7 +8558,7 @@
           <p:nvPr/>
         </p:nvPicPr>
         <p:blipFill>
-          <a:blip r:embed="rId13"/>
+          <a:blip r:embed="rId11"/>
           <a:stretch>
             <a:fillRect/>
           </a:stretch>
@@ -8586,6 +8567,42 @@
           <a:xfrm>
             <a:off x="4592421" y="10159290"/>
             <a:ext cx="872162" cy="307822"/>
+          </a:xfrm>
+          <a:prstGeom prst="rect">
+            <a:avLst/>
+          </a:prstGeom>
+        </p:spPr>
+      </p:pic>
+      <p:pic>
+        <p:nvPicPr>
+          <p:cNvPr id="13" name="Grafik 12">
+            <a:extLst>
+              <a:ext uri="{FF2B5EF4-FFF2-40B4-BE49-F238E27FC236}">
+                <a16:creationId xmlns:a16="http://schemas.microsoft.com/office/drawing/2014/main" id="{F16FB788-623C-2520-5177-4F0C3CBFF4DE}"/>
+              </a:ext>
+            </a:extLst>
+          </p:cNvPr>
+          <p:cNvPicPr>
+            <a:picLocks noChangeAspect="1"/>
+          </p:cNvPicPr>
+          <p:nvPr/>
+        </p:nvPicPr>
+        <p:blipFill>
+          <a:blip r:embed="rId12">
+            <a:extLst>
+              <a:ext uri="{96DAC541-7B7A-43D3-8B79-37D633B846F1}">
+                <asvg:svgBlip xmlns:asvg="http://schemas.microsoft.com/office/drawing/2016/SVG/main" r:embed="rId13"/>
+              </a:ext>
+            </a:extLst>
+          </a:blip>
+          <a:stretch>
+            <a:fillRect/>
+          </a:stretch>
+        </p:blipFill>
+        <p:spPr>
+          <a:xfrm>
+            <a:off x="1792941" y="11941533"/>
+            <a:ext cx="2342421" cy="1171211"/>
           </a:xfrm>
           <a:prstGeom prst="rect">
             <a:avLst/>

</xml_diff>